<commit_message>
Added an idea in storyboard
:)
</commit_message>
<xml_diff>
--- a/docs/IdeasStoryboard.pptx
+++ b/docs/IdeasStoryboard.pptx
@@ -5,11 +5,12 @@
     <p:sldMasterId id="2147483648" r:id="rId1"/>
   </p:sldMasterIdLst>
   <p:notesMasterIdLst>
-    <p:notesMasterId r:id="rId4"/>
+    <p:notesMasterId r:id="rId5"/>
   </p:notesMasterIdLst>
   <p:sldIdLst>
     <p:sldId id="256" r:id="rId2"/>
     <p:sldId id="257" r:id="rId3"/>
+    <p:sldId id="258" r:id="rId4"/>
   </p:sldIdLst>
   <p:sldSz cx="12192000" cy="6858000"/>
   <p:notesSz cx="6858000" cy="9144000"/>
@@ -128,7 +129,9 @@
           <p14:sldIdLst/>
         </p14:section>
         <p14:section name="Guitar Solo" id="{F80EB492-4851-434C-810C-595831544DA8}">
-          <p14:sldIdLst/>
+          <p14:sldIdLst>
+            <p14:sldId id="258"/>
+          </p14:sldIdLst>
         </p14:section>
         <p14:section name="Instrumental Break 2" id="{37BEE898-10B4-4EDC-8546-6E099C5966F5}">
           <p14:sldIdLst/>
@@ -140,6 +143,9 @@
           <p14:sldIdLst/>
         </p14:section>
       </p14:sectionLst>
+    </p:ext>
+    <p:ext uri="{EFAFB233-063F-42B5-8137-9DF3F51BA10A}">
+      <p15:sldGuideLst xmlns:p15="http://schemas.microsoft.com/office/powerpoint/2012/main"/>
     </p:ext>
   </p:extLst>
 </p:presentation>
@@ -590,6 +596,127 @@
     <p:extLst>
       <p:ext uri="{BB962C8B-B14F-4D97-AF65-F5344CB8AC3E}">
         <p14:creationId xmlns:p14="http://schemas.microsoft.com/office/powerpoint/2010/main" val="3855468171"/>
+      </p:ext>
+    </p:extLst>
+  </p:cSld>
+  <p:clrMapOvr>
+    <a:masterClrMapping/>
+  </p:clrMapOvr>
+</p:notes>
+</file>
+
+<file path=ppt/notesSlides/notesSlide2.xml><?xml version="1.0" encoding="utf-8"?>
+<p:notes xmlns:a="http://schemas.openxmlformats.org/drawingml/2006/main" xmlns:r="http://schemas.openxmlformats.org/officeDocument/2006/relationships" xmlns:p="http://schemas.openxmlformats.org/presentationml/2006/main">
+  <p:cSld>
+    <p:spTree>
+      <p:nvGrpSpPr>
+        <p:cNvPr id="1" name=""/>
+        <p:cNvGrpSpPr/>
+        <p:nvPr/>
+      </p:nvGrpSpPr>
+      <p:grpSpPr>
+        <a:xfrm>
+          <a:off x="0" y="0"/>
+          <a:ext cx="0" cy="0"/>
+          <a:chOff x="0" y="0"/>
+          <a:chExt cx="0" cy="0"/>
+        </a:xfrm>
+      </p:grpSpPr>
+      <p:sp>
+        <p:nvSpPr>
+          <p:cNvPr id="2" name="Slide Image Placeholder 1"/>
+          <p:cNvSpPr>
+            <a:spLocks noGrp="1" noRot="1" noChangeAspect="1"/>
+          </p:cNvSpPr>
+          <p:nvPr>
+            <p:ph type="sldImg"/>
+          </p:nvPr>
+        </p:nvSpPr>
+        <p:spPr/>
+      </p:sp>
+      <p:sp>
+        <p:nvSpPr>
+          <p:cNvPr id="3" name="Notes Placeholder 2"/>
+          <p:cNvSpPr>
+            <a:spLocks noGrp="1"/>
+          </p:cNvSpPr>
+          <p:nvPr>
+            <p:ph type="body" idx="1"/>
+          </p:nvPr>
+        </p:nvSpPr>
+        <p:spPr/>
+        <p:txBody>
+          <a:bodyPr/>
+          <a:lstStyle/>
+          <a:p>
+            <a:r>
+              <a:rPr lang="en-US" dirty="0" smtClean="0"/>
+              <a:t>Triangles decay except for some red center or some cool pattern of red/evil</a:t>
+            </a:r>
+          </a:p>
+          <a:p>
+            <a:endParaRPr lang="en-US" dirty="0" smtClean="0"/>
+          </a:p>
+          <a:p>
+            <a:r>
+              <a:rPr lang="en-US" dirty="0" smtClean="0"/>
+              <a:t>Use</a:t>
+            </a:r>
+            <a:r>
+              <a:rPr lang="en-US" baseline="0" dirty="0" smtClean="0"/>
+              <a:t> </a:t>
+            </a:r>
+            <a:r>
+              <a:rPr lang="en-US" baseline="0" dirty="0" err="1" smtClean="0"/>
+              <a:t>floodfill</a:t>
+            </a:r>
+            <a:r>
+              <a:rPr lang="en-US" baseline="0" dirty="0" smtClean="0"/>
+              <a:t> collision detection (edit the </a:t>
+            </a:r>
+            <a:r>
+              <a:rPr lang="en-US" baseline="0" dirty="0" err="1" smtClean="0"/>
+              <a:t>floodfill</a:t>
+            </a:r>
+            <a:r>
+              <a:rPr lang="en-US" baseline="0" dirty="0" smtClean="0"/>
+              <a:t> function to make the color a different mode and have the triangles exit instead as a cool </a:t>
+            </a:r>
+            <a:r>
+              <a:rPr lang="en-US" baseline="0" smtClean="0"/>
+              <a:t>effect)</a:t>
+            </a:r>
+            <a:endParaRPr lang="en-US" baseline="0" dirty="0" smtClean="0"/>
+          </a:p>
+        </p:txBody>
+      </p:sp>
+      <p:sp>
+        <p:nvSpPr>
+          <p:cNvPr id="4" name="Slide Number Placeholder 3"/>
+          <p:cNvSpPr>
+            <a:spLocks noGrp="1"/>
+          </p:cNvSpPr>
+          <p:nvPr>
+            <p:ph type="sldNum" sz="quarter" idx="10"/>
+          </p:nvPr>
+        </p:nvSpPr>
+        <p:spPr/>
+        <p:txBody>
+          <a:bodyPr/>
+          <a:lstStyle/>
+          <a:p>
+            <a:fld id="{DB2023FD-6DCF-4061-9423-8571626C087B}" type="slidenum">
+              <a:rPr lang="en-US" smtClean="0"/>
+              <a:t>3</a:t>
+            </a:fld>
+            <a:endParaRPr lang="en-US"/>
+          </a:p>
+        </p:txBody>
+      </p:sp>
+    </p:spTree>
+    <p:extLst>
+      <p:ext uri="{BB962C8B-B14F-4D97-AF65-F5344CB8AC3E}">
+        <p14:creationId xmlns:p14="http://schemas.microsoft.com/office/powerpoint/2010/main" val="3053932154"/>
       </p:ext>
     </p:extLst>
   </p:cSld>
@@ -3996,6 +4123,150 @@
     <p:extLst>
       <p:ext uri="{BB962C8B-B14F-4D97-AF65-F5344CB8AC3E}">
         <p14:creationId xmlns:p14="http://schemas.microsoft.com/office/powerpoint/2010/main" val="1085014994"/>
+      </p:ext>
+    </p:extLst>
+  </p:cSld>
+  <p:clrMapOvr>
+    <a:masterClrMapping/>
+  </p:clrMapOvr>
+</p:sld>
+</file>
+
+<file path=ppt/slides/slide3.xml><?xml version="1.0" encoding="utf-8"?>
+<p:sld xmlns:a="http://schemas.openxmlformats.org/drawingml/2006/main" xmlns:r="http://schemas.openxmlformats.org/officeDocument/2006/relationships" xmlns:p="http://schemas.openxmlformats.org/presentationml/2006/main">
+  <p:cSld>
+    <p:spTree>
+      <p:nvGrpSpPr>
+        <p:cNvPr id="1" name=""/>
+        <p:cNvGrpSpPr/>
+        <p:nvPr/>
+      </p:nvGrpSpPr>
+      <p:grpSpPr>
+        <a:xfrm>
+          <a:off x="0" y="0"/>
+          <a:ext cx="0" cy="0"/>
+          <a:chOff x="0" y="0"/>
+          <a:chExt cx="0" cy="0"/>
+        </a:xfrm>
+      </p:grpSpPr>
+      <p:sp>
+        <p:nvSpPr>
+          <p:cNvPr id="2" name="Text Placeholder 1"/>
+          <p:cNvSpPr>
+            <a:spLocks noGrp="1"/>
+          </p:cNvSpPr>
+          <p:nvPr>
+            <p:ph type="body" sz="quarter" idx="10"/>
+          </p:nvPr>
+        </p:nvSpPr>
+        <p:spPr/>
+        <p:txBody>
+          <a:bodyPr>
+            <a:normAutofit fontScale="92500" lnSpcReduction="20000"/>
+          </a:bodyPr>
+          <a:lstStyle/>
+          <a:p>
+            <a:r>
+              <a:rPr lang="en-US" dirty="0" smtClean="0"/>
+              <a:t>100845</a:t>
+            </a:r>
+            <a:endParaRPr lang="en-US" dirty="0"/>
+          </a:p>
+        </p:txBody>
+      </p:sp>
+      <p:sp>
+        <p:nvSpPr>
+          <p:cNvPr id="4" name="Diamond 3"/>
+          <p:cNvSpPr/>
+          <p:nvPr/>
+        </p:nvSpPr>
+        <p:spPr>
+          <a:xfrm>
+            <a:off x="271305" y="914400"/>
+            <a:ext cx="11615896" cy="5406013"/>
+          </a:xfrm>
+          <a:prstGeom prst="diamond">
+            <a:avLst/>
+          </a:prstGeom>
+          <a:noFill/>
+          <a:ln w="254000">
+            <a:solidFill>
+              <a:srgbClr val="FF0000"/>
+            </a:solidFill>
+          </a:ln>
+        </p:spPr>
+        <p:style>
+          <a:lnRef idx="2">
+            <a:schemeClr val="accent1">
+              <a:shade val="50000"/>
+            </a:schemeClr>
+          </a:lnRef>
+          <a:fillRef idx="1">
+            <a:schemeClr val="accent1"/>
+          </a:fillRef>
+          <a:effectRef idx="0">
+            <a:schemeClr val="accent1"/>
+          </a:effectRef>
+          <a:fontRef idx="minor">
+            <a:schemeClr val="lt1"/>
+          </a:fontRef>
+        </p:style>
+        <p:txBody>
+          <a:bodyPr rtlCol="0" anchor="ctr"/>
+          <a:lstStyle/>
+          <a:p>
+            <a:pPr algn="ctr"/>
+            <a:endParaRPr lang="en-US"/>
+          </a:p>
+        </p:txBody>
+      </p:sp>
+      <p:sp>
+        <p:nvSpPr>
+          <p:cNvPr id="6" name="Diamond 5"/>
+          <p:cNvSpPr/>
+          <p:nvPr/>
+        </p:nvSpPr>
+        <p:spPr>
+          <a:xfrm>
+            <a:off x="4059534" y="2863780"/>
+            <a:ext cx="4039437" cy="1668027"/>
+          </a:xfrm>
+          <a:prstGeom prst="diamond">
+            <a:avLst/>
+          </a:prstGeom>
+          <a:solidFill>
+            <a:srgbClr val="FF0000"/>
+          </a:solidFill>
+        </p:spPr>
+        <p:style>
+          <a:lnRef idx="2">
+            <a:schemeClr val="accent1">
+              <a:shade val="50000"/>
+            </a:schemeClr>
+          </a:lnRef>
+          <a:fillRef idx="1">
+            <a:schemeClr val="accent1"/>
+          </a:fillRef>
+          <a:effectRef idx="0">
+            <a:schemeClr val="accent1"/>
+          </a:effectRef>
+          <a:fontRef idx="minor">
+            <a:schemeClr val="lt1"/>
+          </a:fontRef>
+        </p:style>
+        <p:txBody>
+          <a:bodyPr rtlCol="0" anchor="ctr"/>
+          <a:lstStyle/>
+          <a:p>
+            <a:pPr algn="ctr"/>
+            <a:endParaRPr lang="en-US"/>
+          </a:p>
+        </p:txBody>
+      </p:sp>
+    </p:spTree>
+    <p:extLst>
+      <p:ext uri="{BB962C8B-B14F-4D97-AF65-F5344CB8AC3E}">
+        <p14:creationId xmlns:p14="http://schemas.microsoft.com/office/powerpoint/2010/main" val="212260873"/>
       </p:ext>
     </p:extLst>
   </p:cSld>

</xml_diff>